<commit_message>
List of live turtles appears on playback
</commit_message>
<xml_diff>
--- a/Documents/Presentation.pptx
+++ b/Documents/Presentation.pptx
@@ -6,15 +6,14 @@
     <p:sldMasterId id="2147483650" r:id="rId2"/>
   </p:sldMasterIdLst>
   <p:notesMasterIdLst>
-    <p:notesMasterId r:id="rId9"/>
+    <p:notesMasterId r:id="rId8"/>
   </p:notesMasterIdLst>
   <p:sldIdLst>
     <p:sldId id="256" r:id="rId3"/>
     <p:sldId id="258" r:id="rId4"/>
     <p:sldId id="259" r:id="rId5"/>
     <p:sldId id="262" r:id="rId6"/>
-    <p:sldId id="260" r:id="rId7"/>
-    <p:sldId id="261" r:id="rId8"/>
+    <p:sldId id="261" r:id="rId7"/>
   </p:sldIdLst>
   <p:sldSz cx="12192000" cy="6858000"/>
   <p:notesSz cx="6858000" cy="9144000"/>
@@ -115,10 +114,10 @@
   </p:defaultTextStyle>
   <p:extLst>
     <p:ext uri="{EFAFB233-063F-42B5-8137-9DF3F51BA10A}">
-      <p15:sldGuideLst xmlns:p15="http://schemas.microsoft.com/office/powerpoint/2012/main" xmlns=""/>
+      <p15:sldGuideLst xmlns="" xmlns:p15="http://schemas.microsoft.com/office/powerpoint/2012/main"/>
     </p:ext>
     <p:ext uri="{2D200454-40CA-4A62-9FC3-DE9A4176ACB9}">
-      <p15:notesGuideLst xmlns:p15="http://schemas.microsoft.com/office/powerpoint/2012/main" xmlns=""/>
+      <p15:notesGuideLst xmlns="" xmlns:p15="http://schemas.microsoft.com/office/powerpoint/2012/main"/>
     </p:ext>
   </p:extLst>
 </p:presentation>
@@ -206,7 +205,7 @@
           <a:p>
             <a:fld id="{1F38C5BE-9BD1-49FC-838E-49599207D466}" type="datetimeFigureOut">
               <a:rPr lang="en-GB" smtClean="0"/>
-              <a:t>05/02/19</a:t>
+              <a:t>06/02/19</a:t>
             </a:fld>
             <a:endParaRPr lang="en-GB"/>
           </a:p>
@@ -2065,7 +2064,6 @@
               <a:rPr lang="en-US" dirty="0" smtClean="0"/>
               <a:t>Computer Lab / Microsoft Research</a:t>
             </a:r>
-            <a:endParaRPr lang="en-US" dirty="0" smtClean="0"/>
           </a:p>
         </p:txBody>
       </p:sp>
@@ -2265,7 +2263,6 @@
               <a:rPr lang="en-GB" dirty="0" smtClean="0"/>
               <a:t>Subdivided</a:t>
             </a:r>
-            <a:endParaRPr lang="en-GB" dirty="0" smtClean="0"/>
           </a:p>
         </p:txBody>
       </p:sp>
@@ -2450,7 +2447,6 @@
               <a:rPr lang="en-GB" dirty="0" smtClean="0"/>
               <a:t>Direction changes</a:t>
             </a:r>
-            <a:endParaRPr lang="en-GB" dirty="0" smtClean="0"/>
           </a:p>
           <a:p>
             <a:pPr marL="1485900" lvl="2" indent="-342900">
@@ -2627,11 +2623,7 @@
             </a:pPr>
             <a:r>
               <a:rPr lang="en-GB" dirty="0" smtClean="0"/>
-              <a:t>Nesting</a:t>
-            </a:r>
-            <a:r>
-              <a:rPr lang="en-GB" dirty="0" smtClean="0"/>
-              <a:t>: “</a:t>
+              <a:t>Nesting: “</a:t>
             </a:r>
             <a:r>
               <a:rPr lang="en-GB" dirty="0" smtClean="0">
@@ -2980,7 +2972,7 @@
           <a:p>
             <a:r>
               <a:rPr lang="en-GB" dirty="0" smtClean="0"/>
-              <a:t>Other Features</a:t>
+              <a:t>Next Steps</a:t>
             </a:r>
             <a:endParaRPr lang="en-GB" dirty="0"/>
           </a:p>
@@ -3007,122 +2999,6 @@
             </a:pPr>
             <a:r>
               <a:rPr lang="en-GB" dirty="0" smtClean="0"/>
-              <a:t>Piano Samples</a:t>
-            </a:r>
-          </a:p>
-          <a:p>
-            <a:pPr marL="342900" indent="-342900">
-              <a:buFont typeface="Arial"/>
-              <a:buChar char="•"/>
-            </a:pPr>
-            <a:r>
-              <a:rPr lang="en-GB" dirty="0" smtClean="0"/>
-              <a:t>Chord inputs</a:t>
-            </a:r>
-          </a:p>
-          <a:p>
-            <a:pPr marL="342900" indent="-342900">
-              <a:buFont typeface="Arial"/>
-              <a:buChar char="•"/>
-            </a:pPr>
-            <a:r>
-              <a:rPr lang="en-GB" dirty="0" smtClean="0"/>
-              <a:t>Octave context</a:t>
-            </a:r>
-          </a:p>
-          <a:p>
-            <a:pPr marL="342900" indent="-342900">
-              <a:buFont typeface="Arial"/>
-              <a:buChar char="•"/>
-            </a:pPr>
-            <a:r>
-              <a:rPr lang="en-GB" dirty="0" smtClean="0"/>
-              <a:t>Activation</a:t>
-            </a:r>
-          </a:p>
-        </p:txBody>
-      </p:sp>
-    </p:spTree>
-    <p:extLst>
-      <p:ext uri="{BB962C8B-B14F-4D97-AF65-F5344CB8AC3E}">
-        <p14:creationId xmlns:p14="http://schemas.microsoft.com/office/powerpoint/2010/main" val="3809430248"/>
-      </p:ext>
-    </p:extLst>
-  </p:cSld>
-  <p:clrMapOvr>
-    <a:masterClrMapping/>
-  </p:clrMapOvr>
-  <p:timing>
-    <p:tnLst>
-      <p:par>
-        <p:cTn xmlns:p14="http://schemas.microsoft.com/office/powerpoint/2010/main" id="1" dur="indefinite" restart="never" nodeType="tmRoot"/>
-      </p:par>
-    </p:tnLst>
-  </p:timing>
-</p:sld>
-</file>
-
-<file path=ppt/slides/slide6.xml><?xml version="1.0" encoding="utf-8"?>
-<p:sld xmlns:a="http://schemas.openxmlformats.org/drawingml/2006/main" xmlns:r="http://schemas.openxmlformats.org/officeDocument/2006/relationships" xmlns:p="http://schemas.openxmlformats.org/presentationml/2006/main">
-  <p:cSld>
-    <p:spTree>
-      <p:nvGrpSpPr>
-        <p:cNvPr id="1" name=""/>
-        <p:cNvGrpSpPr/>
-        <p:nvPr/>
-      </p:nvGrpSpPr>
-      <p:grpSpPr>
-        <a:xfrm>
-          <a:off x="0" y="0"/>
-          <a:ext cx="0" cy="0"/>
-          <a:chOff x="0" y="0"/>
-          <a:chExt cx="0" cy="0"/>
-        </a:xfrm>
-      </p:grpSpPr>
-      <p:sp>
-        <p:nvSpPr>
-          <p:cNvPr id="2" name="Text Placeholder 1"/>
-          <p:cNvSpPr>
-            <a:spLocks noGrp="1"/>
-          </p:cNvSpPr>
-          <p:nvPr>
-            <p:ph type="body" sz="quarter" idx="10"/>
-          </p:nvPr>
-        </p:nvSpPr>
-        <p:spPr/>
-        <p:txBody>
-          <a:bodyPr/>
-          <a:lstStyle/>
-          <a:p>
-            <a:r>
-              <a:rPr lang="en-GB" dirty="0" smtClean="0"/>
-              <a:t>Next Steps</a:t>
-            </a:r>
-            <a:endParaRPr lang="en-GB" dirty="0"/>
-          </a:p>
-        </p:txBody>
-      </p:sp>
-      <p:sp>
-        <p:nvSpPr>
-          <p:cNvPr id="3" name="Content Placeholder 2"/>
-          <p:cNvSpPr>
-            <a:spLocks noGrp="1"/>
-          </p:cNvSpPr>
-          <p:nvPr>
-            <p:ph idx="1"/>
-          </p:nvPr>
-        </p:nvSpPr>
-        <p:spPr/>
-        <p:txBody>
-          <a:bodyPr/>
-          <a:lstStyle/>
-          <a:p>
-            <a:pPr marL="342900" indent="-342900">
-              <a:buFont typeface="Arial"/>
-              <a:buChar char="•"/>
-            </a:pPr>
-            <a:r>
-              <a:rPr lang="en-GB" dirty="0" smtClean="0"/>
               <a:t>Features</a:t>
             </a:r>
           </a:p>
@@ -3187,7 +3063,6 @@
               <a:rPr lang="en-GB" dirty="0" smtClean="0"/>
               <a:t>Excel notation -&gt; MIDI?</a:t>
             </a:r>
-            <a:endParaRPr lang="en-GB" dirty="0" smtClean="0"/>
           </a:p>
           <a:p>
             <a:pPr marL="342900" indent="-342900">
@@ -3477,7 +3352,7 @@
   <a:extraClrSchemeLst/>
   <a:extLst>
     <a:ext uri="{05A4C25C-085E-4340-85A3-A5531E510DB2}">
-      <thm15:themeFamily xmlns:thm15="http://schemas.microsoft.com/office/thememl/2012/main" xmlns="" name="Office Theme" id="{62F939B6-93AF-4DB8-9C6B-D6C7DFDC589F}" vid="{4A3C46E8-61CC-4603-A589-7422A47A8E4A}"/>
+      <thm15:themeFamily xmlns="" xmlns:thm15="http://schemas.microsoft.com/office/thememl/2012/main" name="Office Theme" id="{62F939B6-93AF-4DB8-9C6B-D6C7DFDC589F}" vid="{4A3C46E8-61CC-4603-A589-7422A47A8E4A}"/>
     </a:ext>
   </a:extLst>
 </a:theme>
@@ -3738,7 +3613,7 @@
   <a:extraClrSchemeLst/>
   <a:extLst>
     <a:ext uri="{05A4C25C-085E-4340-85A3-A5531E510DB2}">
-      <thm15:themeFamily xmlns:thm15="http://schemas.microsoft.com/office/thememl/2012/main" xmlns="" name="Office Theme" id="{62F939B6-93AF-4DB8-9C6B-D6C7DFDC589F}" vid="{4A3C46E8-61CC-4603-A589-7422A47A8E4A}"/>
+      <thm15:themeFamily xmlns="" xmlns:thm15="http://schemas.microsoft.com/office/thememl/2012/main" name="Office Theme" id="{62F939B6-93AF-4DB8-9C6B-D6C7DFDC589F}" vid="{4A3C46E8-61CC-4603-A589-7422A47A8E4A}"/>
     </a:ext>
   </a:extLst>
 </a:theme>
@@ -3999,7 +3874,7 @@
   <a:extraClrSchemeLst/>
   <a:extLst>
     <a:ext uri="{05A4C25C-085E-4340-85A3-A5531E510DB2}">
-      <thm15:themeFamily xmlns:thm15="http://schemas.microsoft.com/office/thememl/2012/main" xmlns="" name="Office Theme" id="{62F939B6-93AF-4DB8-9C6B-D6C7DFDC589F}" vid="{4A3C46E8-61CC-4603-A589-7422A47A8E4A}"/>
+      <thm15:themeFamily xmlns="" xmlns:thm15="http://schemas.microsoft.com/office/thememl/2012/main" name="Office Theme" id="{62F939B6-93AF-4DB8-9C6B-D6C7DFDC589F}" vid="{4A3C46E8-61CC-4603-A589-7422A47A8E4A}"/>
     </a:ext>
   </a:extLst>
 </a:theme>

</xml_diff>